<commit_message>
Doxygen do Leitor/Exibidor gerado!
</commit_message>
<xml_diff>
--- a/LeitorExibidor/Documentos/Leitor-Exibidor Bytecode Java.pptx
+++ b/LeitorExibidor/Documentos/Leitor-Exibidor Bytecode Java.pptx
@@ -388,7 +388,8 @@
           <a:p>
             <a:fld id="{5773EE37-23DE-423B-A16A-A203D0189D9D}" type="datetimeFigureOut">
               <a:rPr lang="pt-BR" smtClean="0"/>
-              <a:t>02/06/2015</a:t>
+              <a:pPr/>
+              <a:t>03/06/2015</a:t>
             </a:fld>
             <a:endParaRPr lang="pt-BR"/>
           </a:p>
@@ -617,6 +618,7 @@
           <a:p>
             <a:fld id="{700F882C-3443-40ED-8875-45EEA68AAFCD}" type="slidenum">
               <a:rPr lang="pt-BR" smtClean="0"/>
+              <a:pPr/>
               <a:t>‹nº›</a:t>
             </a:fld>
             <a:endParaRPr lang="pt-BR"/>
@@ -781,7 +783,8 @@
           <a:p>
             <a:fld id="{5773EE37-23DE-423B-A16A-A203D0189D9D}" type="datetimeFigureOut">
               <a:rPr lang="pt-BR" smtClean="0"/>
-              <a:t>02/06/2015</a:t>
+              <a:pPr/>
+              <a:t>03/06/2015</a:t>
             </a:fld>
             <a:endParaRPr lang="pt-BR"/>
           </a:p>
@@ -823,6 +826,7 @@
           <a:p>
             <a:fld id="{700F882C-3443-40ED-8875-45EEA68AAFCD}" type="slidenum">
               <a:rPr lang="pt-BR" smtClean="0"/>
+              <a:pPr/>
               <a:t>‹nº›</a:t>
             </a:fld>
             <a:endParaRPr lang="pt-BR"/>
@@ -1233,6 +1237,7 @@
           <a:p>
             <a:fld id="{700F882C-3443-40ED-8875-45EEA68AAFCD}" type="slidenum">
               <a:rPr lang="pt-BR" smtClean="0"/>
+              <a:pPr/>
               <a:t>‹nº›</a:t>
             </a:fld>
             <a:endParaRPr lang="pt-BR"/>
@@ -1313,7 +1318,8 @@
           <a:p>
             <a:fld id="{5773EE37-23DE-423B-A16A-A203D0189D9D}" type="datetimeFigureOut">
               <a:rPr lang="pt-BR" smtClean="0"/>
-              <a:t>02/06/2015</a:t>
+              <a:pPr/>
+              <a:t>03/06/2015</a:t>
             </a:fld>
             <a:endParaRPr lang="pt-BR"/>
           </a:p>
@@ -1446,7 +1452,8 @@
           <a:p>
             <a:fld id="{5773EE37-23DE-423B-A16A-A203D0189D9D}" type="datetimeFigureOut">
               <a:rPr lang="pt-BR" smtClean="0"/>
-              <a:t>02/06/2015</a:t>
+              <a:pPr/>
+              <a:t>03/06/2015</a:t>
             </a:fld>
             <a:endParaRPr lang="pt-BR"/>
           </a:p>
@@ -1493,6 +1500,7 @@
           <a:p>
             <a:fld id="{700F882C-3443-40ED-8875-45EEA68AAFCD}" type="slidenum">
               <a:rPr lang="pt-BR" smtClean="0"/>
+              <a:pPr/>
               <a:t>‹nº›</a:t>
             </a:fld>
             <a:endParaRPr lang="pt-BR"/>
@@ -1989,7 +1997,8 @@
           <a:p>
             <a:fld id="{5773EE37-23DE-423B-A16A-A203D0189D9D}" type="datetimeFigureOut">
               <a:rPr lang="pt-BR" smtClean="0"/>
-              <a:t>02/06/2015</a:t>
+              <a:pPr/>
+              <a:t>03/06/2015</a:t>
             </a:fld>
             <a:endParaRPr lang="pt-BR"/>
           </a:p>
@@ -2161,6 +2170,7 @@
           <a:p>
             <a:fld id="{700F882C-3443-40ED-8875-45EEA68AAFCD}" type="slidenum">
               <a:rPr lang="pt-BR" smtClean="0"/>
+              <a:pPr/>
               <a:t>‹nº›</a:t>
             </a:fld>
             <a:endParaRPr lang="pt-BR"/>
@@ -2284,7 +2294,8 @@
           <a:p>
             <a:fld id="{5773EE37-23DE-423B-A16A-A203D0189D9D}" type="datetimeFigureOut">
               <a:rPr lang="pt-BR" smtClean="0"/>
-              <a:t>02/06/2015</a:t>
+              <a:pPr/>
+              <a:t>03/06/2015</a:t>
             </a:fld>
             <a:endParaRPr lang="pt-BR"/>
           </a:p>
@@ -2326,6 +2337,7 @@
           <a:p>
             <a:fld id="{700F882C-3443-40ED-8875-45EEA68AAFCD}" type="slidenum">
               <a:rPr lang="pt-BR" smtClean="0"/>
+              <a:pPr/>
               <a:t>‹nº›</a:t>
             </a:fld>
             <a:endParaRPr lang="pt-BR"/>
@@ -2943,7 +2955,8 @@
           <a:p>
             <a:fld id="{5773EE37-23DE-423B-A16A-A203D0189D9D}" type="datetimeFigureOut">
               <a:rPr lang="pt-BR" smtClean="0"/>
-              <a:t>02/06/2015</a:t>
+              <a:pPr/>
+              <a:t>03/06/2015</a:t>
             </a:fld>
             <a:endParaRPr lang="pt-BR"/>
           </a:p>
@@ -3285,6 +3298,7 @@
           <a:p>
             <a:fld id="{700F882C-3443-40ED-8875-45EEA68AAFCD}" type="slidenum">
               <a:rPr lang="pt-BR" smtClean="0"/>
+              <a:pPr/>
               <a:t>‹nº›</a:t>
             </a:fld>
             <a:endParaRPr lang="pt-BR"/>
@@ -3379,7 +3393,8 @@
           <a:p>
             <a:fld id="{5773EE37-23DE-423B-A16A-A203D0189D9D}" type="datetimeFigureOut">
               <a:rPr lang="pt-BR" smtClean="0"/>
-              <a:t>02/06/2015</a:t>
+              <a:pPr/>
+              <a:t>03/06/2015</a:t>
             </a:fld>
             <a:endParaRPr lang="pt-BR"/>
           </a:p>
@@ -3426,6 +3441,7 @@
           <a:p>
             <a:fld id="{700F882C-3443-40ED-8875-45EEA68AAFCD}" type="slidenum">
               <a:rPr lang="pt-BR" smtClean="0"/>
+              <a:pPr/>
               <a:t>‹nº›</a:t>
             </a:fld>
             <a:endParaRPr lang="pt-BR"/>
@@ -3692,7 +3708,8 @@
           <a:p>
             <a:fld id="{5773EE37-23DE-423B-A16A-A203D0189D9D}" type="datetimeFigureOut">
               <a:rPr lang="pt-BR" smtClean="0"/>
-              <a:t>02/06/2015</a:t>
+              <a:pPr/>
+              <a:t>03/06/2015</a:t>
             </a:fld>
             <a:endParaRPr lang="pt-BR"/>
           </a:p>
@@ -3747,6 +3764,7 @@
           <a:p>
             <a:fld id="{700F882C-3443-40ED-8875-45EEA68AAFCD}" type="slidenum">
               <a:rPr lang="pt-BR" smtClean="0"/>
+              <a:pPr/>
               <a:t>‹nº›</a:t>
             </a:fld>
             <a:endParaRPr lang="pt-BR"/>
@@ -4365,6 +4383,7 @@
           <a:p>
             <a:fld id="{700F882C-3443-40ED-8875-45EEA68AAFCD}" type="slidenum">
               <a:rPr lang="pt-BR" smtClean="0"/>
+              <a:pPr/>
               <a:t>‹nº›</a:t>
             </a:fld>
             <a:endParaRPr lang="pt-BR"/>
@@ -4424,7 +4443,8 @@
           <a:p>
             <a:fld id="{5773EE37-23DE-423B-A16A-A203D0189D9D}" type="datetimeFigureOut">
               <a:rPr lang="pt-BR" smtClean="0"/>
-              <a:t>02/06/2015</a:t>
+              <a:pPr/>
+              <a:t>03/06/2015</a:t>
             </a:fld>
             <a:endParaRPr lang="pt-BR"/>
           </a:p>
@@ -4899,6 +4919,7 @@
           <a:p>
             <a:fld id="{700F882C-3443-40ED-8875-45EEA68AAFCD}" type="slidenum">
               <a:rPr lang="pt-BR" smtClean="0"/>
+              <a:pPr/>
               <a:t>‹nº›</a:t>
             </a:fld>
             <a:endParaRPr lang="pt-BR"/>
@@ -5088,7 +5109,8 @@
           <a:p>
             <a:fld id="{5773EE37-23DE-423B-A16A-A203D0189D9D}" type="datetimeFigureOut">
               <a:rPr lang="pt-BR" smtClean="0"/>
-              <a:t>02/06/2015</a:t>
+              <a:pPr/>
+              <a:t>03/06/2015</a:t>
             </a:fld>
             <a:endParaRPr lang="pt-BR"/>
           </a:p>
@@ -5361,7 +5383,8 @@
           <a:p>
             <a:fld id="{5773EE37-23DE-423B-A16A-A203D0189D9D}" type="datetimeFigureOut">
               <a:rPr lang="pt-BR" smtClean="0"/>
-              <a:t>02/06/2015</a:t>
+              <a:pPr/>
+              <a:t>03/06/2015</a:t>
             </a:fld>
             <a:endParaRPr lang="pt-BR"/>
           </a:p>
@@ -5611,6 +5634,7 @@
           <a:p>
             <a:fld id="{700F882C-3443-40ED-8875-45EEA68AAFCD}" type="slidenum">
               <a:rPr lang="pt-BR" smtClean="0"/>
+              <a:pPr/>
               <a:t>‹nº›</a:t>
             </a:fld>
             <a:endParaRPr lang="pt-BR"/>
@@ -6205,7 +6229,7 @@
       </p:sp>
       <p:pic>
         <p:nvPicPr>
-          <p:cNvPr id="1026" name="Picture 2" descr="C:\Users\Diogo\Documents\UnB\Software Básico\Leitor - Exibidor\trunk\LeitorExibidor\Documentos\diagramaDeModulos.png"/>
+          <p:cNvPr id="4" name="Picture 2" descr="C:\Users\Diogo\Documents\UnB\Software Básico\Leitor - Exibidor\trunk\LeitorExibidor\Documentos\diagramaDeModulos.png"/>
           <p:cNvPicPr>
             <a:picLocks noChangeAspect="1" noChangeArrowheads="1"/>
           </p:cNvPicPr>
@@ -6221,7 +6245,7 @@
         <p:spPr bwMode="auto">
           <a:xfrm>
             <a:off x="0" y="0"/>
-            <a:ext cx="9132169" cy="6849126"/>
+            <a:ext cx="9144000" cy="6858001"/>
           </a:xfrm>
           <a:prstGeom prst="rect">
             <a:avLst/>

</xml_diff>